<commit_message>
fully pass ex2 .
</commit_message>
<xml_diff>
--- a/week3/Logistic Regression-exam-3-20180930.pptx
+++ b/week3/Logistic Regression-exam-3-20180930.pptx
@@ -15149,18 +15149,7 @@
                 <a:ea typeface="MS PGothic" pitchFamily="34" charset="-128"/>
                 <a:cs typeface="Arial" panose="020B0604020202020204" pitchFamily="34" charset="0"/>
               </a:rPr>
-              <a:t>2018</a:t>
-            </a:r>
-            <a:r>
-              <a:rPr lang="en-US" altLang="zh-CN" sz="1200" b="1" dirty="0" smtClean="0">
-                <a:solidFill>
-                  <a:srgbClr val="666666"/>
-                </a:solidFill>
-                <a:latin typeface="Arial" panose="020B0604020202020204" pitchFamily="34" charset="0"/>
-                <a:ea typeface="MS PGothic" pitchFamily="34" charset="-128"/>
-                <a:cs typeface="Arial" panose="020B0604020202020204" pitchFamily="34" charset="0"/>
-              </a:rPr>
-              <a:t>/10/05</a:t>
+              <a:t>2018/10/05</a:t>
             </a:r>
             <a:endParaRPr lang="en-US" altLang="zh-CN" sz="1200" b="1" dirty="0">
               <a:solidFill>
@@ -15734,6 +15723,54 @@
           </a:p>
         </p:txBody>
       </p:sp>
+      <p:pic>
+        <p:nvPicPr>
+          <p:cNvPr id="4" name="图片 3"/>
+          <p:cNvPicPr>
+            <a:picLocks noChangeAspect="1"/>
+          </p:cNvPicPr>
+          <p:nvPr/>
+        </p:nvPicPr>
+        <p:blipFill>
+          <a:blip r:embed="rId2"/>
+          <a:stretch>
+            <a:fillRect/>
+          </a:stretch>
+        </p:blipFill>
+        <p:spPr>
+          <a:xfrm>
+            <a:off x="357672" y="2479015"/>
+            <a:ext cx="11479832" cy="1482182"/>
+          </a:xfrm>
+          <a:prstGeom prst="rect">
+            <a:avLst/>
+          </a:prstGeom>
+        </p:spPr>
+      </p:pic>
+      <p:pic>
+        <p:nvPicPr>
+          <p:cNvPr id="6" name="图片 5"/>
+          <p:cNvPicPr>
+            <a:picLocks noChangeAspect="1"/>
+          </p:cNvPicPr>
+          <p:nvPr/>
+        </p:nvPicPr>
+        <p:blipFill>
+          <a:blip r:embed="rId3"/>
+          <a:stretch>
+            <a:fillRect/>
+          </a:stretch>
+        </p:blipFill>
+        <p:spPr>
+          <a:xfrm>
+            <a:off x="517588" y="1432372"/>
+            <a:ext cx="9396423" cy="1271555"/>
+          </a:xfrm>
+          <a:prstGeom prst="rect">
+            <a:avLst/>
+          </a:prstGeom>
+        </p:spPr>
+      </p:pic>
     </p:spTree>
     <p:extLst>
       <p:ext uri="{BB962C8B-B14F-4D97-AF65-F5344CB8AC3E}">

</xml_diff>